<commit_message>
poster final version 2019-01-13
</commit_message>
<xml_diff>
--- a/Presentation_material/poster.pptx
+++ b/Presentation_material/poster.pptx
@@ -5,14 +5,13 @@
     <p:sldMasterId id="2147483648" r:id="rId1"/>
   </p:sldMasterIdLst>
   <p:notesMasterIdLst>
-    <p:notesMasterId r:id="rId4"/>
+    <p:notesMasterId r:id="rId3"/>
   </p:notesMasterIdLst>
   <p:handoutMasterIdLst>
-    <p:handoutMasterId r:id="rId5"/>
+    <p:handoutMasterId r:id="rId4"/>
   </p:handoutMasterIdLst>
   <p:sldIdLst>
     <p:sldId id="256" r:id="rId2"/>
-    <p:sldId id="257" r:id="rId3"/>
   </p:sldIdLst>
   <p:sldSz cx="36004500" cy="25201563"/>
   <p:notesSz cx="46342300" cy="46342300"/>
@@ -255,11 +254,11 @@
           <c:showBubbleSize val="0"/>
         </c:dLbls>
         <c:gapWidth val="150"/>
-        <c:axId val="139179520"/>
-        <c:axId val="127304832"/>
+        <c:axId val="183620608"/>
+        <c:axId val="183208768"/>
       </c:barChart>
       <c:catAx>
-        <c:axId val="139179520"/>
+        <c:axId val="183620608"/>
         <c:scaling>
           <c:orientation val="minMax"/>
         </c:scaling>
@@ -278,7 +277,7 @@
             <a:endParaRPr lang="en-US"/>
           </a:p>
         </c:txPr>
-        <c:crossAx val="127304832"/>
+        <c:crossAx val="183208768"/>
         <c:crosses val="autoZero"/>
         <c:auto val="1"/>
         <c:lblAlgn val="ctr"/>
@@ -286,7 +285,7 @@
         <c:noMultiLvlLbl val="0"/>
       </c:catAx>
       <c:valAx>
-        <c:axId val="127304832"/>
+        <c:axId val="183208768"/>
         <c:scaling>
           <c:orientation val="minMax"/>
         </c:scaling>
@@ -297,7 +296,7 @@
         <c:majorTickMark val="out"/>
         <c:minorTickMark val="none"/>
         <c:tickLblPos val="nextTo"/>
-        <c:crossAx val="139179520"/>
+        <c:crossAx val="183620608"/>
         <c:crosses val="autoZero"/>
         <c:crossBetween val="between"/>
       </c:valAx>
@@ -430,11 +429,11 @@
           <c:showPercent val="0"/>
           <c:showBubbleSize val="0"/>
         </c:dLbls>
-        <c:axId val="127310592"/>
-        <c:axId val="127311168"/>
+        <c:axId val="184557568"/>
+        <c:axId val="184558144"/>
       </c:scatterChart>
       <c:valAx>
-        <c:axId val="127310592"/>
+        <c:axId val="184557568"/>
         <c:scaling>
           <c:orientation val="minMax"/>
           <c:max val="4"/>
@@ -449,12 +448,12 @@
         <c:spPr>
           <a:ln w="12700"/>
         </c:spPr>
-        <c:crossAx val="127311168"/>
+        <c:crossAx val="184558144"/>
         <c:crosses val="autoZero"/>
         <c:crossBetween val="midCat"/>
       </c:valAx>
       <c:valAx>
-        <c:axId val="127311168"/>
+        <c:axId val="184558144"/>
         <c:scaling>
           <c:orientation val="minMax"/>
           <c:max val="2"/>
@@ -465,7 +464,7 @@
         <c:majorTickMark val="none"/>
         <c:minorTickMark val="none"/>
         <c:tickLblPos val="nextTo"/>
-        <c:crossAx val="127310592"/>
+        <c:crossAx val="184557568"/>
         <c:crosses val="autoZero"/>
         <c:crossBetween val="midCat"/>
         <c:majorUnit val="1"/>
@@ -603,11 +602,11 @@
           <c:showPercent val="0"/>
           <c:showBubbleSize val="0"/>
         </c:dLbls>
-        <c:axId val="145163392"/>
-        <c:axId val="145163968"/>
+        <c:axId val="184559872"/>
+        <c:axId val="184560448"/>
       </c:scatterChart>
       <c:valAx>
-        <c:axId val="145163392"/>
+        <c:axId val="184559872"/>
         <c:scaling>
           <c:orientation val="minMax"/>
           <c:max val="4"/>
@@ -622,12 +621,12 @@
         <c:spPr>
           <a:ln w="12700"/>
         </c:spPr>
-        <c:crossAx val="145163968"/>
+        <c:crossAx val="184560448"/>
         <c:crosses val="autoZero"/>
         <c:crossBetween val="midCat"/>
       </c:valAx>
       <c:valAx>
-        <c:axId val="145163968"/>
+        <c:axId val="184560448"/>
         <c:scaling>
           <c:orientation val="minMax"/>
           <c:max val="2"/>
@@ -638,7 +637,7 @@
         <c:majorTickMark val="none"/>
         <c:minorTickMark val="none"/>
         <c:tickLblPos val="nextTo"/>
-        <c:crossAx val="145163392"/>
+        <c:crossAx val="184559872"/>
         <c:crosses val="autoZero"/>
         <c:crossBetween val="midCat"/>
         <c:majorUnit val="1"/>
@@ -776,11 +775,11 @@
           <c:showPercent val="0"/>
           <c:showBubbleSize val="0"/>
         </c:dLbls>
-        <c:axId val="145165696"/>
-        <c:axId val="145166272"/>
+        <c:axId val="184562176"/>
+        <c:axId val="184562752"/>
       </c:scatterChart>
       <c:valAx>
-        <c:axId val="145165696"/>
+        <c:axId val="184562176"/>
         <c:scaling>
           <c:orientation val="minMax"/>
           <c:max val="4"/>
@@ -795,12 +794,12 @@
         <c:spPr>
           <a:ln w="12700"/>
         </c:spPr>
-        <c:crossAx val="145166272"/>
+        <c:crossAx val="184562752"/>
         <c:crosses val="autoZero"/>
         <c:crossBetween val="midCat"/>
       </c:valAx>
       <c:valAx>
-        <c:axId val="145166272"/>
+        <c:axId val="184562752"/>
         <c:scaling>
           <c:orientation val="minMax"/>
           <c:max val="2"/>
@@ -811,7 +810,7 @@
         <c:majorTickMark val="none"/>
         <c:minorTickMark val="none"/>
         <c:tickLblPos val="nextTo"/>
-        <c:crossAx val="145165696"/>
+        <c:crossAx val="184562176"/>
         <c:crosses val="autoZero"/>
         <c:crossBetween val="midCat"/>
         <c:majorUnit val="1"/>
@@ -984,11 +983,11 @@
           <c:showBubbleSize val="0"/>
         </c:dLbls>
         <c:gapWidth val="150"/>
-        <c:axId val="168633344"/>
-        <c:axId val="167598848"/>
+        <c:axId val="184293376"/>
+        <c:axId val="182829056"/>
       </c:barChart>
       <c:catAx>
-        <c:axId val="168633344"/>
+        <c:axId val="184293376"/>
         <c:scaling>
           <c:orientation val="minMax"/>
         </c:scaling>
@@ -1007,7 +1006,7 @@
             <a:endParaRPr lang="en-US"/>
           </a:p>
         </c:txPr>
-        <c:crossAx val="167598848"/>
+        <c:crossAx val="182829056"/>
         <c:crosses val="autoZero"/>
         <c:auto val="1"/>
         <c:lblAlgn val="ctr"/>
@@ -1015,7 +1014,7 @@
         <c:noMultiLvlLbl val="0"/>
       </c:catAx>
       <c:valAx>
-        <c:axId val="167598848"/>
+        <c:axId val="182829056"/>
         <c:scaling>
           <c:orientation val="minMax"/>
           <c:max val="100"/>
@@ -1038,7 +1037,7 @@
             <a:endParaRPr lang="en-US"/>
           </a:p>
         </c:txPr>
-        <c:crossAx val="168633344"/>
+        <c:crossAx val="184293376"/>
         <c:crosses val="autoZero"/>
         <c:crossBetween val="between"/>
       </c:valAx>
@@ -5396,7 +5395,7 @@
         </p:nvSpPr>
         <p:spPr bwMode="auto">
           <a:xfrm>
-            <a:off x="5771200" y="10314782"/>
+            <a:off x="5758318" y="10314782"/>
             <a:ext cx="20345400" cy="12307310"/>
           </a:xfrm>
           <a:prstGeom prst="roundRect">
@@ -6764,11 +6763,7 @@
                       </a:r>
                       <a:r>
                         <a:rPr lang="sv-SE" sz="2800" dirty="0" smtClean="0"/>
-                        <a:t>-Xu et al. </a:t>
-                      </a:r>
-                      <a:r>
-                        <a:rPr lang="sv-SE" sz="2800" dirty="0" smtClean="0"/>
-                        <a:t>[3]</a:t>
+                        <a:t>-Xu et al. [3]</a:t>
                       </a:r>
                       <a:endParaRPr lang="en-GB" sz="2800" dirty="0"/>
                     </a:p>
@@ -6904,11 +6899,7 @@
                       <a:pPr algn="ctr"/>
                       <a:r>
                         <a:rPr lang="sv-SE" sz="2800" dirty="0" smtClean="0"/>
-                        <a:t>Li et al. </a:t>
-                      </a:r>
-                      <a:r>
-                        <a:rPr lang="sv-SE" sz="2800" dirty="0" smtClean="0"/>
-                        <a:t>[4]</a:t>
+                        <a:t>Li et al. [4]</a:t>
                       </a:r>
                       <a:endParaRPr lang="en-GB" sz="2800" dirty="0"/>
                     </a:p>
@@ -7044,11 +7035,7 @@
                       <a:pPr algn="ctr"/>
                       <a:r>
                         <a:rPr lang="sv-SE" sz="2800" dirty="0" smtClean="0"/>
-                        <a:t>Marcos et al. </a:t>
-                      </a:r>
-                      <a:r>
-                        <a:rPr lang="sv-SE" sz="2800" dirty="0" smtClean="0"/>
-                        <a:t>[5]</a:t>
+                        <a:t>Marcos et al. [5]</a:t>
                       </a:r>
                       <a:endParaRPr lang="en-GB" sz="2800" dirty="0"/>
                     </a:p>
@@ -8129,8 +8116,8 @@
           </a:graphicData>
         </a:graphic>
       </p:graphicFrame>
-      <mc:AlternateContent xmlns:mc="http://schemas.openxmlformats.org/markup-compatibility/2006">
-        <mc:Choice xmlns:a14="http://schemas.microsoft.com/office/drawing/2010/main" Requires="a14">
+      <mc:AlternateContent xmlns:mc="http://schemas.openxmlformats.org/markup-compatibility/2006" xmlns:a14="http://schemas.microsoft.com/office/drawing/2010/main">
+        <mc:Choice Requires="a14">
           <p:sp>
             <p:nvSpPr>
               <p:cNvPr id="13" name="TextBox 12"/>
@@ -8173,23 +8160,7 @@
                 </a:pPr>
                 <a:r>
                   <a:rPr lang="en-GB" sz="3200" dirty="0" smtClean="0"/>
-                  <a:t>512 fixed </a:t>
-                </a:r>
-                <a:r>
-                  <a:rPr lang="en-GB" sz="3200" dirty="0" smtClean="0"/>
-                  <a:t>random </a:t>
-                </a:r>
-                <a:r>
-                  <a:rPr lang="en-GB" sz="3200" dirty="0" smtClean="0"/>
-                  <a:t>±</a:t>
-                </a:r>
-                <a:r>
-                  <a:rPr lang="en-GB" sz="3200" dirty="0" smtClean="0"/>
-                  <a:t>1 </a:t>
-                </a:r>
-                <a:r>
-                  <a:rPr lang="en-GB" sz="3200" dirty="0" smtClean="0"/>
-                  <a:t>filters </a:t>
+                  <a:t>512 fixed random ±1 filters </a:t>
                 </a:r>
                 <a14:m>
                   <m:oMath xmlns:m="http://schemas.openxmlformats.org/officeDocument/2006/math">
@@ -8329,26 +8300,14 @@
                 </a14:m>
                 <a:r>
                   <a:rPr lang="en-GB" sz="3200" dirty="0" smtClean="0"/>
-                  <a:t> used in </a:t>
-                </a:r>
-                <a:r>
-                  <a:rPr lang="en-GB" sz="3200" dirty="0" smtClean="0"/>
-                  <a:t>linear </a:t>
-                </a:r>
-                <a:r>
-                  <a:rPr lang="en-GB" sz="3200" dirty="0" smtClean="0"/>
-                  <a:t>sum to </a:t>
-                </a:r>
-                <a:r>
-                  <a:rPr lang="en-GB" sz="3200" dirty="0" smtClean="0"/>
-                  <a:t>create feature map</a:t>
+                  <a:t> used in linear sum to create feature map</a:t>
                 </a:r>
                 <a:endParaRPr lang="en-GB" sz="3200" dirty="0"/>
               </a:p>
             </p:txBody>
           </p:sp>
         </mc:Choice>
-        <mc:Fallback>
+        <mc:Fallback xmlns="">
           <p:sp>
             <p:nvSpPr>
               <p:cNvPr id="13" name="TextBox 12"/>
@@ -8527,7 +8486,6 @@
               <a:rPr lang="en-GB" sz="3200" dirty="0" smtClean="0"/>
               <a:t>Activation magnitude &amp; direction forms 2D vector field output</a:t>
             </a:r>
-            <a:endParaRPr lang="en-GB" sz="3200" dirty="0" smtClean="0"/>
           </a:p>
         </p:txBody>
       </p:sp>
@@ -8555,8 +8513,8 @@
           </a:graphicData>
         </a:graphic>
       </p:graphicFrame>
-      <mc:AlternateContent xmlns:mc="http://schemas.openxmlformats.org/markup-compatibility/2006">
-        <mc:Choice xmlns:a14="http://schemas.microsoft.com/office/drawing/2010/main" Requires="a14">
+      <mc:AlternateContent xmlns:mc="http://schemas.openxmlformats.org/markup-compatibility/2006" xmlns:a14="http://schemas.microsoft.com/office/drawing/2010/main">
+        <mc:Choice Requires="a14">
           <p:sp>
             <p:nvSpPr>
               <p:cNvPr id="56" name="TextBox 55"/>
@@ -8708,7 +8666,7 @@
             </p:txBody>
           </p:sp>
         </mc:Choice>
-        <mc:Fallback>
+        <mc:Fallback xmlns="">
           <p:sp>
             <p:nvSpPr>
               <p:cNvPr id="56" name="TextBox 55"/>
@@ -9489,7 +9447,7 @@
         </p:nvSpPr>
         <p:spPr bwMode="auto">
           <a:xfrm>
-            <a:off x="15716250" y="11991181"/>
+            <a:off x="15820113" y="11991181"/>
             <a:ext cx="429537" cy="457200"/>
           </a:xfrm>
           <a:prstGeom prst="stripedRightArrow">
@@ -9541,44 +9499,6 @@
           </a:p>
         </p:txBody>
       </p:sp>
-      <p:pic>
-        <p:nvPicPr>
-          <p:cNvPr id="14" name="Picture 2"/>
-          <p:cNvPicPr>
-            <a:picLocks noChangeAspect="1" noChangeArrowheads="1"/>
-          </p:cNvPicPr>
-          <p:nvPr/>
-        </p:nvPicPr>
-        <p:blipFill>
-          <a:blip r:embed="rId6">
-            <a:extLst>
-              <a:ext uri="{28A0092B-C50C-407E-A947-70E740481C1C}">
-                <a14:useLocalDpi xmlns:a14="http://schemas.microsoft.com/office/drawing/2010/main" val="0"/>
-              </a:ext>
-            </a:extLst>
-          </a:blip>
-          <a:srcRect/>
-          <a:stretch>
-            <a:fillRect/>
-          </a:stretch>
-        </p:blipFill>
-        <p:spPr bwMode="auto">
-          <a:xfrm>
-            <a:off x="16533922" y="11365508"/>
-            <a:ext cx="2154128" cy="1844873"/>
-          </a:xfrm>
-          <a:prstGeom prst="rect">
-            <a:avLst/>
-          </a:prstGeom>
-          <a:solidFill>
-            <a:schemeClr val="bg1"/>
-          </a:solidFill>
-          <a:ln>
-            <a:noFill/>
-          </a:ln>
-          <a:effectLst/>
-        </p:spPr>
-      </p:pic>
       <p:grpSp>
         <p:nvGrpSpPr>
           <p:cNvPr id="4" name="Group 3"/>
@@ -9587,7 +9507,7 @@
         </p:nvGrpSpPr>
         <p:grpSpPr>
           <a:xfrm>
-            <a:off x="16380252" y="13591125"/>
+            <a:off x="16532652" y="13591125"/>
             <a:ext cx="2460198" cy="381256"/>
             <a:chOff x="16456452" y="13683387"/>
             <a:chExt cx="2460198" cy="381256"/>
@@ -9756,23 +9676,7 @@
                     <a:schemeClr val="bg1"/>
                   </a:solidFill>
                 </a:rPr>
-                <a:t>Output </a:t>
-              </a:r>
-              <a:r>
-                <a:rPr lang="en-GB" sz="1800" dirty="0" smtClean="0">
-                  <a:solidFill>
-                    <a:schemeClr val="bg1"/>
-                  </a:solidFill>
-                </a:rPr>
-                <a:t>feature </a:t>
-              </a:r>
-              <a:r>
-                <a:rPr lang="en-GB" sz="1800" dirty="0" smtClean="0">
-                  <a:solidFill>
-                    <a:schemeClr val="bg1"/>
-                  </a:solidFill>
-                </a:rPr>
-                <a:t>map</a:t>
+                <a:t>Output feature map</a:t>
               </a:r>
               <a:endParaRPr lang="en-GB" sz="1800" dirty="0">
                 <a:solidFill>
@@ -9791,7 +9695,7 @@
         </p:nvSpPr>
         <p:spPr bwMode="auto">
           <a:xfrm>
-            <a:off x="16351000" y="15496381"/>
+            <a:off x="16351000" y="15494959"/>
             <a:ext cx="432050" cy="457200"/>
           </a:xfrm>
           <a:prstGeom prst="stripedRightArrow">
@@ -9922,7 +9826,7 @@
           </p:xfrm>
           <a:graphic>
             <a:graphicData uri="http://schemas.openxmlformats.org/drawingml/2006/chart">
-              <c:chart xmlns:c="http://schemas.openxmlformats.org/drawingml/2006/chart" xmlns:r="http://schemas.openxmlformats.org/officeDocument/2006/relationships" r:id="rId7"/>
+              <c:chart xmlns:c="http://schemas.openxmlformats.org/drawingml/2006/chart" xmlns:r="http://schemas.openxmlformats.org/officeDocument/2006/relationships" r:id="rId6"/>
             </a:graphicData>
           </a:graphic>
         </p:graphicFrame>
@@ -9946,7 +9850,7 @@
           </p:xfrm>
           <a:graphic>
             <a:graphicData uri="http://schemas.openxmlformats.org/drawingml/2006/chart">
-              <c:chart xmlns:c="http://schemas.openxmlformats.org/drawingml/2006/chart" xmlns:r="http://schemas.openxmlformats.org/officeDocument/2006/relationships" r:id="rId8"/>
+              <c:chart xmlns:c="http://schemas.openxmlformats.org/drawingml/2006/chart" xmlns:r="http://schemas.openxmlformats.org/officeDocument/2006/relationships" r:id="rId7"/>
             </a:graphicData>
           </a:graphic>
         </p:graphicFrame>
@@ -9970,7 +9874,7 @@
           </p:xfrm>
           <a:graphic>
             <a:graphicData uri="http://schemas.openxmlformats.org/drawingml/2006/chart">
-              <c:chart xmlns:c="http://schemas.openxmlformats.org/drawingml/2006/chart" xmlns:r="http://schemas.openxmlformats.org/officeDocument/2006/relationships" r:id="rId9"/>
+              <c:chart xmlns:c="http://schemas.openxmlformats.org/drawingml/2006/chart" xmlns:r="http://schemas.openxmlformats.org/officeDocument/2006/relationships" r:id="rId8"/>
             </a:graphicData>
           </a:graphic>
         </p:graphicFrame>
@@ -10035,8 +9939,8 @@
           </a:p>
         </p:txBody>
       </p:sp>
-      <mc:AlternateContent xmlns:mc="http://schemas.openxmlformats.org/markup-compatibility/2006">
-        <mc:Choice xmlns:a14="http://schemas.microsoft.com/office/drawing/2010/main" Requires="a14">
+      <mc:AlternateContent xmlns:mc="http://schemas.openxmlformats.org/markup-compatibility/2006" xmlns:a14="http://schemas.microsoft.com/office/drawing/2010/main">
+        <mc:Choice Requires="a14">
           <p:sp>
             <p:nvSpPr>
               <p:cNvPr id="49" name="TextBox 48"/>
@@ -10080,7 +9984,7 @@
             </p:txBody>
           </p:sp>
         </mc:Choice>
-        <mc:Fallback>
+        <mc:Fallback xmlns="">
           <p:sp>
             <p:nvSpPr>
               <p:cNvPr id="49" name="TextBox 48"/>
@@ -10422,15 +10326,7 @@
             </a:pPr>
             <a:r>
               <a:rPr lang="en-GB" sz="3200" dirty="0" smtClean="0"/>
-              <a:t>6 </a:t>
-            </a:r>
-            <a:r>
-              <a:rPr lang="en-GB" sz="3200" dirty="0" smtClean="0"/>
-              <a:t>patients, 3 </a:t>
-            </a:r>
-            <a:r>
-              <a:rPr lang="en-GB" sz="3200" dirty="0" smtClean="0"/>
-              <a:t>with oral </a:t>
+              <a:t>6 patients, 3 with oral </a:t>
             </a:r>
             <a:r>
               <a:rPr lang="en-GB" sz="3200" dirty="0"/>
@@ -10451,15 +10347,7 @@
             </a:pPr>
             <a:r>
               <a:rPr lang="en-GB" sz="3200" dirty="0" smtClean="0"/>
-              <a:t>10k </a:t>
-            </a:r>
-            <a:r>
-              <a:rPr lang="en-GB" sz="3200" dirty="0" smtClean="0"/>
-              <a:t>cell images (80x80) </a:t>
-            </a:r>
-            <a:r>
-              <a:rPr lang="en-GB" sz="3200" dirty="0" smtClean="0"/>
-              <a:t>[1</a:t>
+              <a:t>10k cell images (80x80) [1</a:t>
             </a:r>
             <a:r>
               <a:rPr lang="en-GB" sz="3200" dirty="0"/>
@@ -10476,15 +10364,7 @@
             </a:pPr>
             <a:r>
               <a:rPr lang="en-GB" sz="3200" dirty="0" smtClean="0"/>
-              <a:t>Only patient diagnosis </a:t>
-            </a:r>
-            <a:r>
-              <a:rPr lang="en-GB" sz="3200" dirty="0" smtClean="0"/>
-              <a:t>known, not individual cell </a:t>
-            </a:r>
-            <a:r>
-              <a:rPr lang="en-GB" sz="3200" dirty="0" smtClean="0"/>
-              <a:t>classification</a:t>
+              <a:t>Only patient diagnosis known, not individual cell classification</a:t>
             </a:r>
           </a:p>
           <a:p>
@@ -10992,11 +10872,7 @@
             </a:pPr>
             <a:r>
               <a:rPr lang="sv-SE" sz="3200" dirty="0" smtClean="0"/>
-              <a:t>LBPs </a:t>
-            </a:r>
-            <a:r>
-              <a:rPr lang="sv-SE" sz="3200" dirty="0" smtClean="0"/>
-              <a:t>[2] are </a:t>
+              <a:t>LBPs [2] are </a:t>
             </a:r>
             <a:r>
               <a:rPr lang="sv-SE" sz="3200" dirty="0"/>
@@ -11017,11 +10893,7 @@
             </a:pPr>
             <a:r>
               <a:rPr lang="en-GB" sz="3200" dirty="0" smtClean="0"/>
-              <a:t>Use intensity level of central pixel to threshold </a:t>
-            </a:r>
-            <a:r>
-              <a:rPr lang="en-GB" sz="3200" dirty="0" smtClean="0"/>
-              <a:t>values </a:t>
+              <a:t>Use intensity level of central pixel to threshold values </a:t>
             </a:r>
             <a:r>
               <a:rPr lang="en-GB" sz="3200" dirty="0"/>
@@ -11063,11 +10935,7 @@
             </a:pPr>
             <a:r>
               <a:rPr lang="en-GB" sz="3200" dirty="0" smtClean="0"/>
-              <a:t>Rotational </a:t>
-            </a:r>
-            <a:r>
-              <a:rPr lang="en-GB" sz="3200" dirty="0" smtClean="0"/>
-              <a:t>equivalents and </a:t>
+              <a:t>Rotational equivalents and </a:t>
             </a:r>
             <a:r>
               <a:rPr lang="en-GB" sz="3200" dirty="0"/>
@@ -11395,10 +11263,10 @@
         </p:nvGrpSpPr>
         <p:grpSpPr>
           <a:xfrm>
-            <a:off x="16478250" y="21469267"/>
-            <a:ext cx="2476999" cy="427914"/>
-            <a:chOff x="15677651" y="21224684"/>
-            <a:chExt cx="2476999" cy="427914"/>
+            <a:off x="16500386" y="21471663"/>
+            <a:ext cx="2476999" cy="366951"/>
+            <a:chOff x="15677651" y="21227443"/>
+            <a:chExt cx="2476999" cy="425155"/>
           </a:xfrm>
         </p:grpSpPr>
         <p:grpSp>
@@ -11544,7 +11412,7 @@
           </p:nvSpPr>
           <p:spPr>
             <a:xfrm>
-              <a:off x="15944850" y="21224684"/>
+              <a:off x="15890216" y="21234471"/>
               <a:ext cx="2127499" cy="369332"/>
             </a:xfrm>
             <a:prstGeom prst="rect">
@@ -11862,7 +11730,7 @@
         </p:nvSpPr>
         <p:spPr bwMode="auto">
           <a:xfrm>
-            <a:off x="8866911" y="20068381"/>
+            <a:off x="8866911" y="19992181"/>
             <a:ext cx="524739" cy="457200"/>
           </a:xfrm>
           <a:prstGeom prst="stripedRightArrow">
@@ -11936,10 +11804,10 @@
           </p:nvGrpSpPr>
           <p:grpSpPr>
             <a:xfrm>
-              <a:off x="12140006" y="21770379"/>
-              <a:ext cx="2591446" cy="443151"/>
-              <a:chOff x="12140006" y="21770379"/>
-              <a:chExt cx="2591446" cy="443151"/>
+              <a:off x="12140011" y="21846574"/>
+              <a:ext cx="2591441" cy="376631"/>
+              <a:chOff x="12140011" y="21846574"/>
+              <a:chExt cx="2591441" cy="376631"/>
             </a:xfrm>
           </p:grpSpPr>
           <p:grpSp>
@@ -11950,10 +11818,10 @@
             </p:nvGrpSpPr>
             <p:grpSpPr>
               <a:xfrm>
-                <a:off x="12140006" y="21770379"/>
-                <a:ext cx="2585644" cy="443151"/>
-                <a:chOff x="21416658" y="4904581"/>
-                <a:chExt cx="1719567" cy="228600"/>
+                <a:off x="12140011" y="21846574"/>
+                <a:ext cx="2585646" cy="355413"/>
+                <a:chOff x="21416657" y="4943880"/>
+                <a:chExt cx="1719568" cy="183340"/>
               </a:xfrm>
             </p:grpSpPr>
             <p:sp>
@@ -11964,8 +11832,8 @@
               </p:nvSpPr>
               <p:spPr bwMode="auto">
                 <a:xfrm flipH="1">
-                  <a:off x="21416658" y="4904581"/>
-                  <a:ext cx="1004869" cy="228600"/>
+                  <a:off x="21416657" y="4943885"/>
+                  <a:ext cx="1004869" cy="183335"/>
                 </a:xfrm>
                 <a:prstGeom prst="homePlate">
                   <a:avLst/>
@@ -12024,8 +11892,8 @@
               </p:nvSpPr>
               <p:spPr bwMode="auto">
                 <a:xfrm>
-                  <a:off x="22421528" y="4904581"/>
-                  <a:ext cx="714697" cy="228600"/>
+                  <a:off x="22421528" y="4943880"/>
+                  <a:ext cx="714697" cy="183336"/>
                 </a:xfrm>
                 <a:prstGeom prst="homePlate">
                   <a:avLst/>
@@ -12085,7 +11953,7 @@
             </p:nvSpPr>
             <p:spPr>
               <a:xfrm>
-                <a:off x="12211050" y="21820981"/>
+                <a:off x="12211050" y="21853873"/>
                 <a:ext cx="2520402" cy="369332"/>
               </a:xfrm>
               <a:prstGeom prst="rect">
@@ -12114,15 +11982,7 @@
                       <a:schemeClr val="bg1"/>
                     </a:solidFill>
                   </a:rPr>
-                  <a:t> </a:t>
-                </a:r>
-                <a:r>
-                  <a:rPr lang="sv-SE" sz="1800" dirty="0" smtClean="0">
-                    <a:solidFill>
-                      <a:schemeClr val="bg1"/>
-                    </a:solidFill>
-                  </a:rPr>
-                  <a:t>rotated copies</a:t>
+                  <a:t> rotated copies</a:t>
                 </a:r>
                 <a:endParaRPr lang="en-GB" sz="1800" dirty="0">
                   <a:solidFill>
@@ -12141,10 +12001,10 @@
           </p:nvGrpSpPr>
           <p:grpSpPr>
             <a:xfrm>
-              <a:off x="9925050" y="20996830"/>
-              <a:ext cx="1981200" cy="443151"/>
-              <a:chOff x="9972697" y="20761782"/>
-              <a:chExt cx="1981200" cy="443151"/>
+              <a:off x="9925050" y="20994449"/>
+              <a:ext cx="1981200" cy="369344"/>
+              <a:chOff x="9972697" y="20759401"/>
+              <a:chExt cx="1981200" cy="369344"/>
             </a:xfrm>
           </p:grpSpPr>
           <p:grpSp>
@@ -12155,10 +12015,10 @@
             </p:nvGrpSpPr>
             <p:grpSpPr>
               <a:xfrm>
-                <a:off x="9972697" y="20761782"/>
-                <a:ext cx="1981200" cy="443151"/>
-                <a:chOff x="21416658" y="4904581"/>
-                <a:chExt cx="1719567" cy="228600"/>
+                <a:off x="9972697" y="20767057"/>
+                <a:ext cx="1981200" cy="361688"/>
+                <a:chOff x="21416658" y="4907297"/>
+                <a:chExt cx="1719567" cy="186577"/>
               </a:xfrm>
             </p:grpSpPr>
             <p:sp>
@@ -12169,8 +12029,8 @@
               </p:nvSpPr>
               <p:spPr bwMode="auto">
                 <a:xfrm flipH="1">
-                  <a:off x="21416658" y="4904581"/>
-                  <a:ext cx="1004869" cy="228600"/>
+                  <a:off x="21416658" y="4907297"/>
+                  <a:ext cx="1004869" cy="186577"/>
                 </a:xfrm>
                 <a:prstGeom prst="homePlate">
                   <a:avLst/>
@@ -12229,8 +12089,8 @@
               </p:nvSpPr>
               <p:spPr bwMode="auto">
                 <a:xfrm>
-                  <a:off x="22421528" y="4904581"/>
-                  <a:ext cx="714697" cy="228600"/>
+                  <a:off x="22421528" y="4907297"/>
+                  <a:ext cx="714697" cy="186577"/>
                 </a:xfrm>
                 <a:prstGeom prst="homePlate">
                   <a:avLst/>
@@ -12290,7 +12150,7 @@
             </p:nvSpPr>
             <p:spPr>
               <a:xfrm>
-                <a:off x="10136714" y="20830381"/>
+                <a:off x="10136714" y="20759401"/>
                 <a:ext cx="1693336" cy="369332"/>
               </a:xfrm>
               <a:prstGeom prst="rect">
@@ -12619,36 +12479,6 @@
           </a:p>
         </p:txBody>
       </p:sp>
-      <p:pic>
-        <p:nvPicPr>
-          <p:cNvPr id="3" name="Picture 2"/>
-          <p:cNvPicPr>
-            <a:picLocks noChangeAspect="1"/>
-          </p:cNvPicPr>
-          <p:nvPr/>
-        </p:nvPicPr>
-        <p:blipFill>
-          <a:blip r:embed="rId24">
-            <a:extLst>
-              <a:ext uri="{28A0092B-C50C-407E-A947-70E740481C1C}">
-                <a14:useLocalDpi xmlns:a14="http://schemas.microsoft.com/office/drawing/2010/main" val="0"/>
-              </a:ext>
-            </a:extLst>
-          </a:blip>
-          <a:stretch>
-            <a:fillRect/>
-          </a:stretch>
-        </p:blipFill>
-        <p:spPr>
-          <a:xfrm>
-            <a:off x="6115050" y="11069581"/>
-            <a:ext cx="2293200" cy="2293200"/>
-          </a:xfrm>
-          <a:prstGeom prst="rect">
-            <a:avLst/>
-          </a:prstGeom>
-        </p:spPr>
-      </p:pic>
       <p:grpSp>
         <p:nvGrpSpPr>
           <p:cNvPr id="18" name="Group 17"/>
@@ -12846,7 +12676,7 @@
         </p:nvSpPr>
         <p:spPr bwMode="auto">
           <a:xfrm>
-            <a:off x="10113727" y="15496381"/>
+            <a:off x="10113727" y="15494959"/>
             <a:ext cx="420923" cy="457200"/>
           </a:xfrm>
           <a:prstGeom prst="stripedRightArrow">
@@ -12907,7 +12737,7 @@
           <p:nvPr/>
         </p:nvPicPr>
         <p:blipFill>
-          <a:blip r:embed="rId25">
+          <a:blip r:embed="rId24">
             <a:extLst>
               <a:ext uri="{28A0092B-C50C-407E-A947-70E740481C1C}">
                 <a14:useLocalDpi xmlns:a14="http://schemas.microsoft.com/office/drawing/2010/main" val="0"/>
@@ -12928,8 +12758,8 @@
           </a:prstGeom>
         </p:spPr>
       </p:pic>
-      <mc:AlternateContent xmlns:mc="http://schemas.openxmlformats.org/markup-compatibility/2006">
-        <mc:Choice xmlns:a14="http://schemas.microsoft.com/office/drawing/2010/main" Requires="a14">
+      <mc:AlternateContent xmlns:mc="http://schemas.openxmlformats.org/markup-compatibility/2006" xmlns:a14="http://schemas.microsoft.com/office/drawing/2010/main">
+        <mc:Choice Requires="a14">
           <p:sp>
             <p:nvSpPr>
               <p:cNvPr id="10" name="TextBox 9"/>
@@ -12952,6 +12782,7 @@
               </a:bodyPr>
               <a:lstStyle/>
               <a:p>
+                <a:pPr/>
                 <a14:m>
                   <m:oMathPara xmlns:m="http://schemas.openxmlformats.org/officeDocument/2006/math">
                     <m:oMathParaPr>
@@ -13009,6 +12840,7 @@
                 </a:endParaRPr>
               </a:p>
               <a:p>
+                <a:pPr/>
                 <a14:m>
                   <m:oMathPara xmlns:m="http://schemas.openxmlformats.org/officeDocument/2006/math">
                     <m:oMathParaPr>
@@ -13065,7 +12897,7 @@
             </p:txBody>
           </p:sp>
         </mc:Choice>
-        <mc:Fallback>
+        <mc:Fallback xmlns="">
           <p:sp>
             <p:nvSpPr>
               <p:cNvPr id="10" name="TextBox 9"/>
@@ -13112,7 +12944,7 @@
         </p:nvSpPr>
         <p:spPr bwMode="auto">
           <a:xfrm>
-            <a:off x="8020050" y="15496381"/>
+            <a:off x="8020050" y="15494959"/>
             <a:ext cx="420923" cy="457200"/>
           </a:xfrm>
           <a:prstGeom prst="stripedRightArrow">
@@ -14680,683 +14512,71 @@
           </a:p>
         </p:txBody>
       </p:sp>
-    </p:spTree>
-  </p:cSld>
-  <p:clrMapOvr>
-    <a:masterClrMapping/>
-  </p:clrMapOvr>
-  <p:timing>
-    <p:tnLst>
-      <p:par>
-        <p:cTn id="1" dur="indefinite" restart="never" nodeType="tmRoot"/>
-      </p:par>
-    </p:tnLst>
-  </p:timing>
-</p:sld>
-</file>
-
-<file path=ppt/slides/slide2.xml><?xml version="1.0" encoding="utf-8"?>
-<p:sld xmlns:a="http://schemas.openxmlformats.org/drawingml/2006/main" xmlns:r="http://schemas.openxmlformats.org/officeDocument/2006/relationships" xmlns:p="http://schemas.openxmlformats.org/presentationml/2006/main">
-  <p:cSld>
-    <p:spTree>
-      <p:nvGrpSpPr>
-        <p:cNvPr id="1" name=""/>
-        <p:cNvGrpSpPr/>
-        <p:nvPr/>
-      </p:nvGrpSpPr>
-      <p:grpSpPr>
-        <a:xfrm>
-          <a:off x="0" y="0"/>
-          <a:ext cx="0" cy="0"/>
-          <a:chOff x="0" y="0"/>
-          <a:chExt cx="0" cy="0"/>
-        </a:xfrm>
-      </p:grpSpPr>
       <p:pic>
         <p:nvPicPr>
-          <p:cNvPr id="5" name="Picture 4"/>
-          <p:cNvPicPr>
-            <a:picLocks noChangeAspect="1"/>
-          </p:cNvPicPr>
+          <p:cNvPr id="144" name="Image2"/>
+          <p:cNvPicPr/>
           <p:nvPr/>
         </p:nvPicPr>
-        <p:blipFill>
-          <a:blip r:embed="rId2">
-            <a:extLst>
-              <a:ext uri="{28A0092B-C50C-407E-A947-70E740481C1C}">
-                <a14:useLocalDpi xmlns:a14="http://schemas.microsoft.com/office/drawing/2010/main" val="0"/>
-              </a:ext>
-            </a:extLst>
+        <p:blipFill rotWithShape="1">
+          <a:blip r:embed="rId29">
+            <a:lum/>
+            <a:alphaModFix/>
           </a:blip>
-          <a:stretch>
-            <a:fillRect/>
-          </a:stretch>
+          <a:srcRect l="1739" t="13221" r="87561" b="76685"/>
+          <a:stretch/>
         </p:blipFill>
-        <p:spPr>
+        <p:spPr bwMode="auto">
           <a:xfrm>
-            <a:off x="18535650" y="8638381"/>
-            <a:ext cx="4476750" cy="4470400"/>
+            <a:off x="6138655" y="11089425"/>
+            <a:ext cx="2270986" cy="2235003"/>
           </a:xfrm>
           <a:prstGeom prst="rect">
             <a:avLst/>
           </a:prstGeom>
+          <a:ln>
+            <a:noFill/>
+          </a:ln>
+          <a:extLst>
+            <a:ext uri="{53640926-AAD7-44D8-BBD7-CCE9431645EC}">
+              <a14:shadowObscured xmlns:a14="http://schemas.microsoft.com/office/drawing/2010/main"/>
+            </a:ext>
+          </a:extLst>
         </p:spPr>
       </p:pic>
       <p:pic>
         <p:nvPicPr>
-          <p:cNvPr id="10" name="Picture 9"/>
-          <p:cNvPicPr>
-            <a:picLocks noChangeAspect="1"/>
-          </p:cNvPicPr>
+          <p:cNvPr id="145" name="Image2"/>
+          <p:cNvPicPr/>
           <p:nvPr/>
         </p:nvPicPr>
-        <p:blipFill>
-          <a:blip r:embed="rId3">
-            <a:extLst>
-              <a:ext uri="{28A0092B-C50C-407E-A947-70E740481C1C}">
-                <a14:useLocalDpi xmlns:a14="http://schemas.microsoft.com/office/drawing/2010/main" val="0"/>
-              </a:ext>
-            </a:extLst>
+        <p:blipFill rotWithShape="1">
+          <a:blip r:embed="rId29">
+            <a:lum/>
+            <a:alphaModFix/>
           </a:blip>
-          <a:stretch>
-            <a:fillRect/>
-          </a:stretch>
+          <a:srcRect l="45336" t="13437" r="44140" b="76939"/>
+          <a:stretch/>
         </p:blipFill>
-        <p:spPr>
-          <a:xfrm rot="859080">
-            <a:off x="19025244" y="9274908"/>
-            <a:ext cx="4476750" cy="4470400"/>
+        <p:spPr bwMode="auto">
+          <a:xfrm>
+            <a:off x="16630650" y="11172239"/>
+            <a:ext cx="2242868" cy="2190542"/>
           </a:xfrm>
           <a:prstGeom prst="rect">
             <a:avLst/>
           </a:prstGeom>
-        </p:spPr>
-      </p:pic>
-      <p:pic>
-        <p:nvPicPr>
-          <p:cNvPr id="11" name="Picture 10"/>
-          <p:cNvPicPr>
-            <a:picLocks noChangeAspect="1"/>
-          </p:cNvPicPr>
-          <p:nvPr/>
-        </p:nvPicPr>
-        <p:blipFill>
-          <a:blip r:embed="rId3">
-            <a:extLst>
-              <a:ext uri="{28A0092B-C50C-407E-A947-70E740481C1C}">
-                <a14:useLocalDpi xmlns:a14="http://schemas.microsoft.com/office/drawing/2010/main" val="0"/>
-              </a:ext>
-            </a:extLst>
-          </a:blip>
-          <a:stretch>
-            <a:fillRect/>
-          </a:stretch>
-        </p:blipFill>
-        <p:spPr>
-          <a:xfrm rot="1771762">
-            <a:off x="19352904" y="10060863"/>
-            <a:ext cx="4476750" cy="4470400"/>
-          </a:xfrm>
-          <a:prstGeom prst="rect">
-            <a:avLst/>
-          </a:prstGeom>
-        </p:spPr>
-      </p:pic>
-      <p:pic>
-        <p:nvPicPr>
-          <p:cNvPr id="12" name="Picture 11"/>
-          <p:cNvPicPr>
-            <a:picLocks noChangeAspect="1"/>
-          </p:cNvPicPr>
-          <p:nvPr/>
-        </p:nvPicPr>
-        <p:blipFill>
-          <a:blip r:embed="rId3">
-            <a:extLst>
-              <a:ext uri="{28A0092B-C50C-407E-A947-70E740481C1C}">
-                <a14:useLocalDpi xmlns:a14="http://schemas.microsoft.com/office/drawing/2010/main" val="0"/>
-              </a:ext>
-            </a:extLst>
-          </a:blip>
-          <a:stretch>
-            <a:fillRect/>
-          </a:stretch>
-        </p:blipFill>
-        <p:spPr>
-          <a:xfrm rot="2596839">
-            <a:off x="19465562" y="10784185"/>
-            <a:ext cx="4476750" cy="4470400"/>
-          </a:xfrm>
-          <a:prstGeom prst="rect">
-            <a:avLst/>
-          </a:prstGeom>
-        </p:spPr>
-      </p:pic>
-      <p:cxnSp>
-        <p:nvCxnSpPr>
-          <p:cNvPr id="14" name="Straight Arrow Connector 13"/>
-          <p:cNvCxnSpPr/>
-          <p:nvPr/>
-        </p:nvCxnSpPr>
-        <p:spPr bwMode="auto">
-          <a:xfrm flipV="1">
-            <a:off x="18535650" y="7114381"/>
-            <a:ext cx="0" cy="5994400"/>
-          </a:xfrm>
-          <a:prstGeom prst="straightConnector1">
-            <a:avLst/>
-          </a:prstGeom>
-          <a:noFill/>
-          <a:ln w="50800" cap="flat" cmpd="sng" algn="ctr">
-            <a:solidFill>
-              <a:schemeClr val="tx1"/>
-            </a:solidFill>
-            <a:prstDash val="solid"/>
-            <a:round/>
-            <a:headEnd type="none" w="med" len="med"/>
-            <a:tailEnd type="triangle" w="lg" len="lg"/>
+          <a:ln>
+            <a:noFill/>
           </a:ln>
-          <a:effectLst/>
           <a:extLst>
-            <a:ext uri="{909E8E84-426E-40DD-AFC4-6F175D3DCCD1}">
-              <a14:hiddenFill xmlns:a14="http://schemas.microsoft.com/office/drawing/2010/main">
-                <a:solidFill>
-                  <a:schemeClr val="accent1"/>
-                </a:solidFill>
-              </a14:hiddenFill>
-            </a:ext>
-            <a:ext uri="{AF507438-7753-43E0-B8FC-AC1667EBCBE1}">
-              <a14:hiddenEffects xmlns:a14="http://schemas.microsoft.com/office/drawing/2010/main">
-                <a:effectLst>
-                  <a:outerShdw dist="35921" dir="2700000" algn="ctr" rotWithShape="0">
-                    <a:schemeClr val="bg2"/>
-                  </a:outerShdw>
-                </a:effectLst>
-              </a14:hiddenEffects>
+            <a:ext uri="{53640926-AAD7-44D8-BBD7-CCE9431645EC}">
+              <a14:shadowObscured xmlns:a14="http://schemas.microsoft.com/office/drawing/2010/main"/>
             </a:ext>
           </a:extLst>
         </p:spPr>
-      </p:cxnSp>
-      <p:cxnSp>
-        <p:nvCxnSpPr>
-          <p:cNvPr id="16" name="Straight Arrow Connector 15"/>
-          <p:cNvCxnSpPr/>
-          <p:nvPr/>
-        </p:nvCxnSpPr>
-        <p:spPr bwMode="auto">
-          <a:xfrm flipV="1">
-            <a:off x="18535650" y="7038181"/>
-            <a:ext cx="1600200" cy="6096000"/>
-          </a:xfrm>
-          <a:prstGeom prst="straightConnector1">
-            <a:avLst/>
-          </a:prstGeom>
-          <a:noFill/>
-          <a:ln w="50800" cap="flat" cmpd="sng" algn="ctr">
-            <a:solidFill>
-              <a:schemeClr val="tx1"/>
-            </a:solidFill>
-            <a:prstDash val="solid"/>
-            <a:round/>
-            <a:headEnd type="none" w="med" len="med"/>
-            <a:tailEnd type="triangle" w="lg" len="lg"/>
-          </a:ln>
-          <a:effectLst/>
-          <a:extLst>
-            <a:ext uri="{909E8E84-426E-40DD-AFC4-6F175D3DCCD1}">
-              <a14:hiddenFill xmlns:a14="http://schemas.microsoft.com/office/drawing/2010/main">
-                <a:solidFill>
-                  <a:schemeClr val="accent1"/>
-                </a:solidFill>
-              </a14:hiddenFill>
-            </a:ext>
-            <a:ext uri="{AF507438-7753-43E0-B8FC-AC1667EBCBE1}">
-              <a14:hiddenEffects xmlns:a14="http://schemas.microsoft.com/office/drawing/2010/main">
-                <a:effectLst>
-                  <a:outerShdw dist="35921" dir="2700000" algn="ctr" rotWithShape="0">
-                    <a:schemeClr val="bg2"/>
-                  </a:outerShdw>
-                </a:effectLst>
-              </a14:hiddenEffects>
-            </a:ext>
-          </a:extLst>
-        </p:spPr>
-      </p:cxnSp>
-      <p:cxnSp>
-        <p:nvCxnSpPr>
-          <p:cNvPr id="18" name="Straight Arrow Connector 17"/>
-          <p:cNvCxnSpPr/>
-          <p:nvPr/>
-        </p:nvCxnSpPr>
-        <p:spPr bwMode="auto">
-          <a:xfrm flipV="1">
-            <a:off x="18535650" y="7495381"/>
-            <a:ext cx="3200400" cy="5638800"/>
-          </a:xfrm>
-          <a:prstGeom prst="straightConnector1">
-            <a:avLst/>
-          </a:prstGeom>
-          <a:noFill/>
-          <a:ln w="50800" cap="flat" cmpd="sng" algn="ctr">
-            <a:solidFill>
-              <a:schemeClr val="tx1"/>
-            </a:solidFill>
-            <a:prstDash val="solid"/>
-            <a:round/>
-            <a:headEnd type="none" w="med" len="med"/>
-            <a:tailEnd type="triangle" w="lg" len="lg"/>
-          </a:ln>
-          <a:effectLst/>
-          <a:extLst>
-            <a:ext uri="{909E8E84-426E-40DD-AFC4-6F175D3DCCD1}">
-              <a14:hiddenFill xmlns:a14="http://schemas.microsoft.com/office/drawing/2010/main">
-                <a:solidFill>
-                  <a:schemeClr val="accent1"/>
-                </a:solidFill>
-              </a14:hiddenFill>
-            </a:ext>
-            <a:ext uri="{AF507438-7753-43E0-B8FC-AC1667EBCBE1}">
-              <a14:hiddenEffects xmlns:a14="http://schemas.microsoft.com/office/drawing/2010/main">
-                <a:effectLst>
-                  <a:outerShdw dist="35921" dir="2700000" algn="ctr" rotWithShape="0">
-                    <a:schemeClr val="bg2"/>
-                  </a:outerShdw>
-                </a:effectLst>
-              </a14:hiddenEffects>
-            </a:ext>
-          </a:extLst>
-        </p:spPr>
-      </p:cxnSp>
-      <p:cxnSp>
-        <p:nvCxnSpPr>
-          <p:cNvPr id="20" name="Straight Arrow Connector 19"/>
-          <p:cNvCxnSpPr/>
-          <p:nvPr/>
-        </p:nvCxnSpPr>
-        <p:spPr bwMode="auto">
-          <a:xfrm flipV="1">
-            <a:off x="18535650" y="8333581"/>
-            <a:ext cx="4572000" cy="4800600"/>
-          </a:xfrm>
-          <a:prstGeom prst="straightConnector1">
-            <a:avLst/>
-          </a:prstGeom>
-          <a:noFill/>
-          <a:ln w="50800" cap="flat" cmpd="sng" algn="ctr">
-            <a:solidFill>
-              <a:schemeClr val="tx1"/>
-            </a:solidFill>
-            <a:prstDash val="solid"/>
-            <a:round/>
-            <a:headEnd type="none" w="med" len="med"/>
-            <a:tailEnd type="triangle" w="lg" len="lg"/>
-          </a:ln>
-          <a:effectLst/>
-          <a:extLst>
-            <a:ext uri="{909E8E84-426E-40DD-AFC4-6F175D3DCCD1}">
-              <a14:hiddenFill xmlns:a14="http://schemas.microsoft.com/office/drawing/2010/main">
-                <a:solidFill>
-                  <a:schemeClr val="accent1"/>
-                </a:solidFill>
-              </a14:hiddenFill>
-            </a:ext>
-            <a:ext uri="{AF507438-7753-43E0-B8FC-AC1667EBCBE1}">
-              <a14:hiddenEffects xmlns:a14="http://schemas.microsoft.com/office/drawing/2010/main">
-                <a:effectLst>
-                  <a:outerShdw dist="35921" dir="2700000" algn="ctr" rotWithShape="0">
-                    <a:schemeClr val="bg2"/>
-                  </a:outerShdw>
-                </a:effectLst>
-              </a14:hiddenEffects>
-            </a:ext>
-          </a:extLst>
-        </p:spPr>
-      </p:cxnSp>
-      <p:sp>
-        <p:nvSpPr>
-          <p:cNvPr id="27" name="Arc 26"/>
-          <p:cNvSpPr/>
-          <p:nvPr/>
-        </p:nvSpPr>
-        <p:spPr bwMode="auto">
-          <a:xfrm rot="19102817">
-            <a:off x="17757956" y="7664044"/>
-            <a:ext cx="2614205" cy="2347065"/>
-          </a:xfrm>
-          <a:prstGeom prst="arc">
-            <a:avLst>
-              <a:gd name="adj1" fmla="val 17560726"/>
-              <a:gd name="adj2" fmla="val 20811108"/>
-            </a:avLst>
-          </a:prstGeom>
-          <a:noFill/>
-          <a:ln w="50800" cap="rnd">
-            <a:solidFill>
-              <a:schemeClr val="tx1"/>
-            </a:solidFill>
-          </a:ln>
-          <a:effectLst/>
-          <a:extLst/>
-        </p:spPr>
-        <p:txBody>
-          <a:bodyPr vert="horz" wrap="square" lIns="457200" tIns="228600" rIns="457200" bIns="228600" numCol="1" rtlCol="0" anchor="t" anchorCtr="0" compatLnSpc="1">
-            <a:prstTxWarp prst="textNoShape">
-              <a:avLst/>
-            </a:prstTxWarp>
-          </a:bodyPr>
-          <a:lstStyle/>
-          <a:p>
-            <a:pPr marL="0" marR="0" indent="0" algn="l" defTabSz="914400" rtl="0" eaLnBrk="1" fontAlgn="base" latinLnBrk="0" hangingPunct="1">
-              <a:lnSpc>
-                <a:spcPct val="100000"/>
-              </a:lnSpc>
-              <a:spcBef>
-                <a:spcPct val="20000"/>
-              </a:spcBef>
-              <a:spcAft>
-                <a:spcPct val="0"/>
-              </a:spcAft>
-              <a:buClrTx/>
-              <a:buSzTx/>
-              <a:buFontTx/>
-              <a:buNone/>
-              <a:tabLst/>
-            </a:pPr>
-            <a:endParaRPr kumimoji="0" lang="en-GB" sz="4600" b="0" i="0" u="none" strike="noStrike" cap="none" normalizeH="0" baseline="0" smtClean="0">
-              <a:ln>
-                <a:noFill/>
-              </a:ln>
-              <a:solidFill>
-                <a:srgbClr val="000000"/>
-              </a:solidFill>
-              <a:effectLst/>
-              <a:latin typeface="Arial" charset="0"/>
-            </a:endParaRPr>
-          </a:p>
-        </p:txBody>
-      </p:sp>
-      <p:sp>
-        <p:nvSpPr>
-          <p:cNvPr id="28" name="TextBox 27"/>
-          <p:cNvSpPr txBox="1"/>
-          <p:nvPr/>
-        </p:nvSpPr>
-        <p:spPr>
-          <a:xfrm>
-            <a:off x="19073042" y="7016839"/>
-            <a:ext cx="453208" cy="630942"/>
-          </a:xfrm>
-          <a:prstGeom prst="rect">
-            <a:avLst/>
-          </a:prstGeom>
-          <a:noFill/>
-        </p:spPr>
-        <p:txBody>
-          <a:bodyPr wrap="square" rtlCol="0">
-            <a:spAutoFit/>
-          </a:bodyPr>
-          <a:lstStyle/>
-          <a:p>
-            <a:r>
-              <a:rPr lang="el-GR" sz="3500" b="1" dirty="0" smtClean="0"/>
-              <a:t>α</a:t>
-            </a:r>
-            <a:endParaRPr lang="en-GB" sz="3500" b="1" dirty="0"/>
-          </a:p>
-        </p:txBody>
-      </p:sp>
-      <p:sp>
-        <p:nvSpPr>
-          <p:cNvPr id="29" name="Arc 28"/>
-          <p:cNvSpPr/>
-          <p:nvPr/>
-        </p:nvSpPr>
-        <p:spPr bwMode="auto">
-          <a:xfrm rot="20013590">
-            <a:off x="18888437" y="7878434"/>
-            <a:ext cx="2614205" cy="2347065"/>
-          </a:xfrm>
-          <a:prstGeom prst="arc">
-            <a:avLst>
-              <a:gd name="adj1" fmla="val 17560726"/>
-              <a:gd name="adj2" fmla="val 20811108"/>
-            </a:avLst>
-          </a:prstGeom>
-          <a:noFill/>
-          <a:ln w="50800" cap="rnd">
-            <a:solidFill>
-              <a:schemeClr val="tx1"/>
-            </a:solidFill>
-          </a:ln>
-          <a:effectLst/>
-          <a:extLst/>
-        </p:spPr>
-        <p:txBody>
-          <a:bodyPr vert="horz" wrap="square" lIns="457200" tIns="228600" rIns="457200" bIns="228600" numCol="1" rtlCol="0" anchor="t" anchorCtr="0" compatLnSpc="1">
-            <a:prstTxWarp prst="textNoShape">
-              <a:avLst/>
-            </a:prstTxWarp>
-          </a:bodyPr>
-          <a:lstStyle/>
-          <a:p>
-            <a:pPr marL="0" marR="0" indent="0" algn="l" defTabSz="914400" rtl="0" eaLnBrk="1" fontAlgn="base" latinLnBrk="0" hangingPunct="1">
-              <a:lnSpc>
-                <a:spcPct val="100000"/>
-              </a:lnSpc>
-              <a:spcBef>
-                <a:spcPct val="20000"/>
-              </a:spcBef>
-              <a:spcAft>
-                <a:spcPct val="0"/>
-              </a:spcAft>
-              <a:buClrTx/>
-              <a:buSzTx/>
-              <a:buFontTx/>
-              <a:buNone/>
-              <a:tabLst/>
-            </a:pPr>
-            <a:endParaRPr kumimoji="0" lang="en-GB" sz="4600" b="0" i="0" u="none" strike="noStrike" cap="none" normalizeH="0" baseline="0" smtClean="0">
-              <a:ln>
-                <a:noFill/>
-              </a:ln>
-              <a:solidFill>
-                <a:srgbClr val="000000"/>
-              </a:solidFill>
-              <a:effectLst/>
-              <a:latin typeface="Arial" charset="0"/>
-            </a:endParaRPr>
-          </a:p>
-        </p:txBody>
-      </p:sp>
-      <p:sp>
-        <p:nvSpPr>
-          <p:cNvPr id="30" name="TextBox 29"/>
-          <p:cNvSpPr txBox="1"/>
-          <p:nvPr/>
-        </p:nvSpPr>
-        <p:spPr>
-          <a:xfrm>
-            <a:off x="20516850" y="7321639"/>
-            <a:ext cx="453208" cy="630942"/>
-          </a:xfrm>
-          <a:prstGeom prst="rect">
-            <a:avLst/>
-          </a:prstGeom>
-          <a:noFill/>
-        </p:spPr>
-        <p:txBody>
-          <a:bodyPr wrap="square" rtlCol="0">
-            <a:spAutoFit/>
-          </a:bodyPr>
-          <a:lstStyle/>
-          <a:p>
-            <a:r>
-              <a:rPr lang="el-GR" sz="3500" b="1" dirty="0" smtClean="0"/>
-              <a:t>α</a:t>
-            </a:r>
-            <a:endParaRPr lang="en-GB" sz="3500" b="1" dirty="0"/>
-          </a:p>
-        </p:txBody>
-      </p:sp>
-      <p:sp>
-        <p:nvSpPr>
-          <p:cNvPr id="31" name="Arc 30"/>
-          <p:cNvSpPr/>
-          <p:nvPr/>
-        </p:nvSpPr>
-        <p:spPr bwMode="auto">
-          <a:xfrm rot="20764226">
-            <a:off x="19868380" y="8373369"/>
-            <a:ext cx="2614205" cy="2347065"/>
-          </a:xfrm>
-          <a:prstGeom prst="arc">
-            <a:avLst>
-              <a:gd name="adj1" fmla="val 17560726"/>
-              <a:gd name="adj2" fmla="val 20811108"/>
-            </a:avLst>
-          </a:prstGeom>
-          <a:noFill/>
-          <a:ln w="50800" cap="rnd">
-            <a:solidFill>
-              <a:schemeClr val="tx1"/>
-            </a:solidFill>
-          </a:ln>
-          <a:effectLst/>
-          <a:extLst/>
-        </p:spPr>
-        <p:txBody>
-          <a:bodyPr vert="horz" wrap="square" lIns="457200" tIns="228600" rIns="457200" bIns="228600" numCol="1" rtlCol="0" anchor="t" anchorCtr="0" compatLnSpc="1">
-            <a:prstTxWarp prst="textNoShape">
-              <a:avLst/>
-            </a:prstTxWarp>
-          </a:bodyPr>
-          <a:lstStyle/>
-          <a:p>
-            <a:pPr marL="0" marR="0" indent="0" algn="l" defTabSz="914400" rtl="0" eaLnBrk="1" fontAlgn="base" latinLnBrk="0" hangingPunct="1">
-              <a:lnSpc>
-                <a:spcPct val="100000"/>
-              </a:lnSpc>
-              <a:spcBef>
-                <a:spcPct val="20000"/>
-              </a:spcBef>
-              <a:spcAft>
-                <a:spcPct val="0"/>
-              </a:spcAft>
-              <a:buClrTx/>
-              <a:buSzTx/>
-              <a:buFontTx/>
-              <a:buNone/>
-              <a:tabLst/>
-            </a:pPr>
-            <a:endParaRPr kumimoji="0" lang="en-GB" sz="4600" b="0" i="0" u="none" strike="noStrike" cap="none" normalizeH="0" baseline="0" smtClean="0">
-              <a:ln>
-                <a:noFill/>
-              </a:ln>
-              <a:solidFill>
-                <a:srgbClr val="000000"/>
-              </a:solidFill>
-              <a:effectLst/>
-              <a:latin typeface="Arial" charset="0"/>
-            </a:endParaRPr>
-          </a:p>
-        </p:txBody>
-      </p:sp>
-      <p:sp>
-        <p:nvSpPr>
-          <p:cNvPr id="32" name="TextBox 31"/>
-          <p:cNvSpPr txBox="1"/>
-          <p:nvPr/>
-        </p:nvSpPr>
-        <p:spPr>
-          <a:xfrm>
-            <a:off x="21812250" y="7952581"/>
-            <a:ext cx="453208" cy="630942"/>
-          </a:xfrm>
-          <a:prstGeom prst="rect">
-            <a:avLst/>
-          </a:prstGeom>
-          <a:noFill/>
-        </p:spPr>
-        <p:txBody>
-          <a:bodyPr wrap="square" rtlCol="0">
-            <a:spAutoFit/>
-          </a:bodyPr>
-          <a:lstStyle/>
-          <a:p>
-            <a:r>
-              <a:rPr lang="el-GR" sz="3500" b="1" dirty="0" smtClean="0"/>
-              <a:t>α</a:t>
-            </a:r>
-            <a:endParaRPr lang="en-GB" sz="3500" b="1" dirty="0"/>
-          </a:p>
-        </p:txBody>
-      </p:sp>
-      <p:pic>
-        <p:nvPicPr>
-          <p:cNvPr id="34" name="Picture 33"/>
-          <p:cNvPicPr>
-            <a:picLocks noChangeAspect="1"/>
-          </p:cNvPicPr>
-          <p:nvPr/>
-        </p:nvPicPr>
-        <p:blipFill>
-          <a:blip r:embed="rId3">
-            <a:extLst>
-              <a:ext uri="{28A0092B-C50C-407E-A947-70E740481C1C}">
-                <a14:useLocalDpi xmlns:a14="http://schemas.microsoft.com/office/drawing/2010/main" val="0"/>
-              </a:ext>
-            </a:extLst>
-          </a:blip>
-          <a:stretch>
-            <a:fillRect/>
-          </a:stretch>
-        </p:blipFill>
-        <p:spPr>
-          <a:xfrm>
-            <a:off x="8629650" y="11410971"/>
-            <a:ext cx="4476750" cy="4470400"/>
-          </a:xfrm>
-          <a:prstGeom prst="rect">
-            <a:avLst/>
-          </a:prstGeom>
-        </p:spPr>
-      </p:pic>
-      <p:pic>
-        <p:nvPicPr>
-          <p:cNvPr id="49" name="Picture 48"/>
-          <p:cNvPicPr>
-            <a:picLocks noChangeAspect="1"/>
-          </p:cNvPicPr>
-          <p:nvPr/>
-        </p:nvPicPr>
-        <p:blipFill>
-          <a:blip r:embed="rId3">
-            <a:extLst>
-              <a:ext uri="{28A0092B-C50C-407E-A947-70E740481C1C}">
-                <a14:useLocalDpi xmlns:a14="http://schemas.microsoft.com/office/drawing/2010/main" val="0"/>
-              </a:ext>
-            </a:extLst>
-          </a:blip>
-          <a:stretch>
-            <a:fillRect/>
-          </a:stretch>
-        </p:blipFill>
-        <p:spPr>
-          <a:xfrm rot="1252875">
-            <a:off x="9279334" y="12413606"/>
-            <a:ext cx="4476750" cy="4470400"/>
-          </a:xfrm>
-          <a:prstGeom prst="rect">
-            <a:avLst/>
-          </a:prstGeom>
-        </p:spPr>
       </p:pic>
     </p:spTree>
-    <p:extLst>
-      <p:ext uri="{BB962C8B-B14F-4D97-AF65-F5344CB8AC3E}">
-        <p14:creationId xmlns:p14="http://schemas.microsoft.com/office/powerpoint/2010/main" val="1213720017"/>
-      </p:ext>
-    </p:extLst>
   </p:cSld>
   <p:clrMapOvr>
     <a:masterClrMapping/>

</xml_diff>